<commit_message>
Added docs of project with ppt and project report
</commit_message>
<xml_diff>
--- a/docs/Invoice_iq.pptx
+++ b/docs/Invoice_iq.pptx
@@ -3560,7 +3560,7 @@
           <a:p>
             <a:r>
               <a:rPr lang="en-US" dirty="0"/>
-              <a:t>555</a:t>
+              <a:t>555G</a:t>
             </a:r>
             <a:endParaRPr lang="en-IN" dirty="0"/>
           </a:p>
@@ -6406,7 +6406,7 @@
               </a:spcBef>
             </a:pPr>
             <a:r>
-              <a:rPr lang="en-US" sz="2234" spc="35">
+              <a:rPr lang="en-US" sz="2234" spc="35" dirty="0">
                 <a:solidFill>
                   <a:srgbClr val="000000"/>
                 </a:solidFill>

</xml_diff>